<commit_message>
add schedule map; organized the code
</commit_message>
<xml_diff>
--- a/111.pptx
+++ b/111.pptx
@@ -104,6 +104,22 @@
       </a:defRPr>
     </a:lvl9pPr>
   </p:defaultTextStyle>
+  <p:extLst>
+    <p:ext uri="{EFAFB233-063F-42B5-8137-9DF3F51BA10A}">
+      <p15:sldGuideLst xmlns:p15="http://schemas.microsoft.com/office/powerpoint/2012/main">
+        <p15:guide id="1" orient="horz" pos="2160" userDrawn="1">
+          <p15:clr>
+            <a:srgbClr val="A4A3A4"/>
+          </p15:clr>
+        </p15:guide>
+        <p15:guide id="2" pos="2880" userDrawn="1">
+          <p15:clr>
+            <a:srgbClr val="A4A3A4"/>
+          </p15:clr>
+        </p15:guide>
+      </p15:sldGuideLst>
+    </p:ext>
+  </p:extLst>
 </p:presentation>
 </file>
 
@@ -149,7 +165,7 @@
           </a:lstStyle>
           <a:p>
             <a:r>
-              <a:rPr lang="en-US" smtClean="0"/>
+              <a:rPr lang="en-US"/>
               <a:t>Click to edit Master title style</a:t>
             </a:r>
             <a:endParaRPr lang="en-US" dirty="0"/>
@@ -214,7 +230,7 @@
           </a:lstStyle>
           <a:p>
             <a:r>
-              <a:rPr lang="en-US" smtClean="0"/>
+              <a:rPr lang="en-US"/>
               <a:t>Click to edit Master subtitle style</a:t>
             </a:r>
             <a:endParaRPr lang="en-US" dirty="0"/>
@@ -238,7 +254,7 @@
           <a:p>
             <a:fld id="{1096303F-26EC-4B2E-AB18-013C2CB4F05F}" type="datetimeFigureOut">
               <a:rPr lang="en-US" smtClean="0"/>
-              <a:t>3/1/2018</a:t>
+              <a:t>3/1/18</a:t>
             </a:fld>
             <a:endParaRPr lang="en-US"/>
           </a:p>
@@ -332,7 +348,7 @@
           <a:lstStyle/>
           <a:p>
             <a:r>
-              <a:rPr lang="en-US" smtClean="0"/>
+              <a:rPr lang="en-US"/>
               <a:t>Click to edit Master title style</a:t>
             </a:r>
             <a:endParaRPr lang="en-US" dirty="0"/>
@@ -356,35 +372,35 @@
           <a:p>
             <a:pPr lvl="0"/>
             <a:r>
-              <a:rPr lang="en-US" smtClean="0"/>
+              <a:rPr lang="en-US"/>
               <a:t>Edit Master text styles</a:t>
             </a:r>
           </a:p>
           <a:p>
             <a:pPr lvl="1"/>
             <a:r>
-              <a:rPr lang="en-US" smtClean="0"/>
+              <a:rPr lang="en-US"/>
               <a:t>Second level</a:t>
             </a:r>
           </a:p>
           <a:p>
             <a:pPr lvl="2"/>
             <a:r>
-              <a:rPr lang="en-US" smtClean="0"/>
+              <a:rPr lang="en-US"/>
               <a:t>Third level</a:t>
             </a:r>
           </a:p>
           <a:p>
             <a:pPr lvl="3"/>
             <a:r>
-              <a:rPr lang="en-US" smtClean="0"/>
+              <a:rPr lang="en-US"/>
               <a:t>Fourth level</a:t>
             </a:r>
           </a:p>
           <a:p>
             <a:pPr lvl="4"/>
             <a:r>
-              <a:rPr lang="en-US" smtClean="0"/>
+              <a:rPr lang="en-US"/>
               <a:t>Fifth level</a:t>
             </a:r>
             <a:endParaRPr lang="en-US" dirty="0"/>
@@ -408,7 +424,7 @@
           <a:p>
             <a:fld id="{1096303F-26EC-4B2E-AB18-013C2CB4F05F}" type="datetimeFigureOut">
               <a:rPr lang="en-US" smtClean="0"/>
-              <a:t>3/1/2018</a:t>
+              <a:t>3/1/18</a:t>
             </a:fld>
             <a:endParaRPr lang="en-US"/>
           </a:p>
@@ -507,7 +523,7 @@
           <a:lstStyle/>
           <a:p>
             <a:r>
-              <a:rPr lang="en-US" smtClean="0"/>
+              <a:rPr lang="en-US"/>
               <a:t>Click to edit Master title style</a:t>
             </a:r>
             <a:endParaRPr lang="en-US" dirty="0"/>
@@ -536,35 +552,35 @@
           <a:p>
             <a:pPr lvl="0"/>
             <a:r>
-              <a:rPr lang="en-US" smtClean="0"/>
+              <a:rPr lang="en-US"/>
               <a:t>Edit Master text styles</a:t>
             </a:r>
           </a:p>
           <a:p>
             <a:pPr lvl="1"/>
             <a:r>
-              <a:rPr lang="en-US" smtClean="0"/>
+              <a:rPr lang="en-US"/>
               <a:t>Second level</a:t>
             </a:r>
           </a:p>
           <a:p>
             <a:pPr lvl="2"/>
             <a:r>
-              <a:rPr lang="en-US" smtClean="0"/>
+              <a:rPr lang="en-US"/>
               <a:t>Third level</a:t>
             </a:r>
           </a:p>
           <a:p>
             <a:pPr lvl="3"/>
             <a:r>
-              <a:rPr lang="en-US" smtClean="0"/>
+              <a:rPr lang="en-US"/>
               <a:t>Fourth level</a:t>
             </a:r>
           </a:p>
           <a:p>
             <a:pPr lvl="4"/>
             <a:r>
-              <a:rPr lang="en-US" smtClean="0"/>
+              <a:rPr lang="en-US"/>
               <a:t>Fifth level</a:t>
             </a:r>
             <a:endParaRPr lang="en-US" dirty="0"/>
@@ -588,7 +604,7 @@
           <a:p>
             <a:fld id="{1096303F-26EC-4B2E-AB18-013C2CB4F05F}" type="datetimeFigureOut">
               <a:rPr lang="en-US" smtClean="0"/>
-              <a:t>3/1/2018</a:t>
+              <a:t>3/1/18</a:t>
             </a:fld>
             <a:endParaRPr lang="en-US"/>
           </a:p>
@@ -682,7 +698,7 @@
           <a:lstStyle/>
           <a:p>
             <a:r>
-              <a:rPr lang="en-US" smtClean="0"/>
+              <a:rPr lang="en-US"/>
               <a:t>Click to edit Master title style</a:t>
             </a:r>
             <a:endParaRPr lang="en-US" dirty="0"/>
@@ -706,35 +722,35 @@
           <a:p>
             <a:pPr lvl="0"/>
             <a:r>
-              <a:rPr lang="en-US" smtClean="0"/>
+              <a:rPr lang="en-US"/>
               <a:t>Edit Master text styles</a:t>
             </a:r>
           </a:p>
           <a:p>
             <a:pPr lvl="1"/>
             <a:r>
-              <a:rPr lang="en-US" smtClean="0"/>
+              <a:rPr lang="en-US"/>
               <a:t>Second level</a:t>
             </a:r>
           </a:p>
           <a:p>
             <a:pPr lvl="2"/>
             <a:r>
-              <a:rPr lang="en-US" smtClean="0"/>
+              <a:rPr lang="en-US"/>
               <a:t>Third level</a:t>
             </a:r>
           </a:p>
           <a:p>
             <a:pPr lvl="3"/>
             <a:r>
-              <a:rPr lang="en-US" smtClean="0"/>
+              <a:rPr lang="en-US"/>
               <a:t>Fourth level</a:t>
             </a:r>
           </a:p>
           <a:p>
             <a:pPr lvl="4"/>
             <a:r>
-              <a:rPr lang="en-US" smtClean="0"/>
+              <a:rPr lang="en-US"/>
               <a:t>Fifth level</a:t>
             </a:r>
             <a:endParaRPr lang="en-US" dirty="0"/>
@@ -758,7 +774,7 @@
           <a:p>
             <a:fld id="{1096303F-26EC-4B2E-AB18-013C2CB4F05F}" type="datetimeFigureOut">
               <a:rPr lang="en-US" smtClean="0"/>
-              <a:t>3/1/2018</a:t>
+              <a:t>3/1/18</a:t>
             </a:fld>
             <a:endParaRPr lang="en-US"/>
           </a:p>
@@ -861,7 +877,7 @@
           </a:lstStyle>
           <a:p>
             <a:r>
-              <a:rPr lang="en-US" smtClean="0"/>
+              <a:rPr lang="en-US"/>
               <a:t>Click to edit Master title style</a:t>
             </a:r>
             <a:endParaRPr lang="en-US" dirty="0"/>
@@ -979,7 +995,7 @@
           <a:p>
             <a:pPr lvl="0"/>
             <a:r>
-              <a:rPr lang="en-US" smtClean="0"/>
+              <a:rPr lang="en-US"/>
               <a:t>Edit Master text styles</a:t>
             </a:r>
           </a:p>
@@ -1002,7 +1018,7 @@
           <a:p>
             <a:fld id="{1096303F-26EC-4B2E-AB18-013C2CB4F05F}" type="datetimeFigureOut">
               <a:rPr lang="en-US" smtClean="0"/>
-              <a:t>3/1/2018</a:t>
+              <a:t>3/1/18</a:t>
             </a:fld>
             <a:endParaRPr lang="en-US"/>
           </a:p>
@@ -1096,7 +1112,7 @@
           <a:lstStyle/>
           <a:p>
             <a:r>
-              <a:rPr lang="en-US" smtClean="0"/>
+              <a:rPr lang="en-US"/>
               <a:t>Click to edit Master title style</a:t>
             </a:r>
             <a:endParaRPr lang="en-US" dirty="0"/>
@@ -1125,35 +1141,35 @@
           <a:p>
             <a:pPr lvl="0"/>
             <a:r>
-              <a:rPr lang="en-US" smtClean="0"/>
+              <a:rPr lang="en-US"/>
               <a:t>Edit Master text styles</a:t>
             </a:r>
           </a:p>
           <a:p>
             <a:pPr lvl="1"/>
             <a:r>
-              <a:rPr lang="en-US" smtClean="0"/>
+              <a:rPr lang="en-US"/>
               <a:t>Second level</a:t>
             </a:r>
           </a:p>
           <a:p>
             <a:pPr lvl="2"/>
             <a:r>
-              <a:rPr lang="en-US" smtClean="0"/>
+              <a:rPr lang="en-US"/>
               <a:t>Third level</a:t>
             </a:r>
           </a:p>
           <a:p>
             <a:pPr lvl="3"/>
             <a:r>
-              <a:rPr lang="en-US" smtClean="0"/>
+              <a:rPr lang="en-US"/>
               <a:t>Fourth level</a:t>
             </a:r>
           </a:p>
           <a:p>
             <a:pPr lvl="4"/>
             <a:r>
-              <a:rPr lang="en-US" smtClean="0"/>
+              <a:rPr lang="en-US"/>
               <a:t>Fifth level</a:t>
             </a:r>
             <a:endParaRPr lang="en-US" dirty="0"/>
@@ -1182,35 +1198,35 @@
           <a:p>
             <a:pPr lvl="0"/>
             <a:r>
-              <a:rPr lang="en-US" smtClean="0"/>
+              <a:rPr lang="en-US"/>
               <a:t>Edit Master text styles</a:t>
             </a:r>
           </a:p>
           <a:p>
             <a:pPr lvl="1"/>
             <a:r>
-              <a:rPr lang="en-US" smtClean="0"/>
+              <a:rPr lang="en-US"/>
               <a:t>Second level</a:t>
             </a:r>
           </a:p>
           <a:p>
             <a:pPr lvl="2"/>
             <a:r>
-              <a:rPr lang="en-US" smtClean="0"/>
+              <a:rPr lang="en-US"/>
               <a:t>Third level</a:t>
             </a:r>
           </a:p>
           <a:p>
             <a:pPr lvl="3"/>
             <a:r>
-              <a:rPr lang="en-US" smtClean="0"/>
+              <a:rPr lang="en-US"/>
               <a:t>Fourth level</a:t>
             </a:r>
           </a:p>
           <a:p>
             <a:pPr lvl="4"/>
             <a:r>
-              <a:rPr lang="en-US" smtClean="0"/>
+              <a:rPr lang="en-US"/>
               <a:t>Fifth level</a:t>
             </a:r>
             <a:endParaRPr lang="en-US" dirty="0"/>
@@ -1234,7 +1250,7 @@
           <a:p>
             <a:fld id="{1096303F-26EC-4B2E-AB18-013C2CB4F05F}" type="datetimeFigureOut">
               <a:rPr lang="en-US" smtClean="0"/>
-              <a:t>3/1/2018</a:t>
+              <a:t>3/1/18</a:t>
             </a:fld>
             <a:endParaRPr lang="en-US"/>
           </a:p>
@@ -1333,7 +1349,7 @@
           <a:lstStyle/>
           <a:p>
             <a:r>
-              <a:rPr lang="en-US" smtClean="0"/>
+              <a:rPr lang="en-US"/>
               <a:t>Click to edit Master title style</a:t>
             </a:r>
             <a:endParaRPr lang="en-US" dirty="0"/>
@@ -1399,7 +1415,7 @@
           <a:p>
             <a:pPr lvl="0"/>
             <a:r>
-              <a:rPr lang="en-US" smtClean="0"/>
+              <a:rPr lang="en-US"/>
               <a:t>Edit Master text styles</a:t>
             </a:r>
           </a:p>
@@ -1427,35 +1443,35 @@
           <a:p>
             <a:pPr lvl="0"/>
             <a:r>
-              <a:rPr lang="en-US" smtClean="0"/>
+              <a:rPr lang="en-US"/>
               <a:t>Edit Master text styles</a:t>
             </a:r>
           </a:p>
           <a:p>
             <a:pPr lvl="1"/>
             <a:r>
-              <a:rPr lang="en-US" smtClean="0"/>
+              <a:rPr lang="en-US"/>
               <a:t>Second level</a:t>
             </a:r>
           </a:p>
           <a:p>
             <a:pPr lvl="2"/>
             <a:r>
-              <a:rPr lang="en-US" smtClean="0"/>
+              <a:rPr lang="en-US"/>
               <a:t>Third level</a:t>
             </a:r>
           </a:p>
           <a:p>
             <a:pPr lvl="3"/>
             <a:r>
-              <a:rPr lang="en-US" smtClean="0"/>
+              <a:rPr lang="en-US"/>
               <a:t>Fourth level</a:t>
             </a:r>
           </a:p>
           <a:p>
             <a:pPr lvl="4"/>
             <a:r>
-              <a:rPr lang="en-US" smtClean="0"/>
+              <a:rPr lang="en-US"/>
               <a:t>Fifth level</a:t>
             </a:r>
             <a:endParaRPr lang="en-US" dirty="0"/>
@@ -1521,7 +1537,7 @@
           <a:p>
             <a:pPr lvl="0"/>
             <a:r>
-              <a:rPr lang="en-US" smtClean="0"/>
+              <a:rPr lang="en-US"/>
               <a:t>Edit Master text styles</a:t>
             </a:r>
           </a:p>
@@ -1549,35 +1565,35 @@
           <a:p>
             <a:pPr lvl="0"/>
             <a:r>
-              <a:rPr lang="en-US" smtClean="0"/>
+              <a:rPr lang="en-US"/>
               <a:t>Edit Master text styles</a:t>
             </a:r>
           </a:p>
           <a:p>
             <a:pPr lvl="1"/>
             <a:r>
-              <a:rPr lang="en-US" smtClean="0"/>
+              <a:rPr lang="en-US"/>
               <a:t>Second level</a:t>
             </a:r>
           </a:p>
           <a:p>
             <a:pPr lvl="2"/>
             <a:r>
-              <a:rPr lang="en-US" smtClean="0"/>
+              <a:rPr lang="en-US"/>
               <a:t>Third level</a:t>
             </a:r>
           </a:p>
           <a:p>
             <a:pPr lvl="3"/>
             <a:r>
-              <a:rPr lang="en-US" smtClean="0"/>
+              <a:rPr lang="en-US"/>
               <a:t>Fourth level</a:t>
             </a:r>
           </a:p>
           <a:p>
             <a:pPr lvl="4"/>
             <a:r>
-              <a:rPr lang="en-US" smtClean="0"/>
+              <a:rPr lang="en-US"/>
               <a:t>Fifth level</a:t>
             </a:r>
             <a:endParaRPr lang="en-US" dirty="0"/>
@@ -1601,7 +1617,7 @@
           <a:p>
             <a:fld id="{1096303F-26EC-4B2E-AB18-013C2CB4F05F}" type="datetimeFigureOut">
               <a:rPr lang="en-US" smtClean="0"/>
-              <a:t>3/1/2018</a:t>
+              <a:t>3/1/18</a:t>
             </a:fld>
             <a:endParaRPr lang="en-US"/>
           </a:p>
@@ -1695,7 +1711,7 @@
           <a:lstStyle/>
           <a:p>
             <a:r>
-              <a:rPr lang="en-US" smtClean="0"/>
+              <a:rPr lang="en-US"/>
               <a:t>Click to edit Master title style</a:t>
             </a:r>
             <a:endParaRPr lang="en-US" dirty="0"/>
@@ -1719,7 +1735,7 @@
           <a:p>
             <a:fld id="{1096303F-26EC-4B2E-AB18-013C2CB4F05F}" type="datetimeFigureOut">
               <a:rPr lang="en-US" smtClean="0"/>
-              <a:t>3/1/2018</a:t>
+              <a:t>3/1/18</a:t>
             </a:fld>
             <a:endParaRPr lang="en-US"/>
           </a:p>
@@ -1814,7 +1830,7 @@
           <a:p>
             <a:fld id="{1096303F-26EC-4B2E-AB18-013C2CB4F05F}" type="datetimeFigureOut">
               <a:rPr lang="en-US" smtClean="0"/>
-              <a:t>3/1/2018</a:t>
+              <a:t>3/1/18</a:t>
             </a:fld>
             <a:endParaRPr lang="en-US"/>
           </a:p>
@@ -1917,7 +1933,7 @@
           </a:lstStyle>
           <a:p>
             <a:r>
-              <a:rPr lang="en-US" smtClean="0"/>
+              <a:rPr lang="en-US"/>
               <a:t>Click to edit Master title style</a:t>
             </a:r>
             <a:endParaRPr lang="en-US" dirty="0"/>
@@ -1974,35 +1990,35 @@
           <a:p>
             <a:pPr lvl="0"/>
             <a:r>
-              <a:rPr lang="en-US" smtClean="0"/>
+              <a:rPr lang="en-US"/>
               <a:t>Edit Master text styles</a:t>
             </a:r>
           </a:p>
           <a:p>
             <a:pPr lvl="1"/>
             <a:r>
-              <a:rPr lang="en-US" smtClean="0"/>
+              <a:rPr lang="en-US"/>
               <a:t>Second level</a:t>
             </a:r>
           </a:p>
           <a:p>
             <a:pPr lvl="2"/>
             <a:r>
-              <a:rPr lang="en-US" smtClean="0"/>
+              <a:rPr lang="en-US"/>
               <a:t>Third level</a:t>
             </a:r>
           </a:p>
           <a:p>
             <a:pPr lvl="3"/>
             <a:r>
-              <a:rPr lang="en-US" smtClean="0"/>
+              <a:rPr lang="en-US"/>
               <a:t>Fourth level</a:t>
             </a:r>
           </a:p>
           <a:p>
             <a:pPr lvl="4"/>
             <a:r>
-              <a:rPr lang="en-US" smtClean="0"/>
+              <a:rPr lang="en-US"/>
               <a:t>Fifth level</a:t>
             </a:r>
             <a:endParaRPr lang="en-US" dirty="0"/>
@@ -2068,7 +2084,7 @@
           <a:p>
             <a:pPr lvl="0"/>
             <a:r>
-              <a:rPr lang="en-US" smtClean="0"/>
+              <a:rPr lang="en-US"/>
               <a:t>Edit Master text styles</a:t>
             </a:r>
           </a:p>
@@ -2091,7 +2107,7 @@
           <a:p>
             <a:fld id="{1096303F-26EC-4B2E-AB18-013C2CB4F05F}" type="datetimeFigureOut">
               <a:rPr lang="en-US" smtClean="0"/>
-              <a:t>3/1/2018</a:t>
+              <a:t>3/1/18</a:t>
             </a:fld>
             <a:endParaRPr lang="en-US"/>
           </a:p>
@@ -2194,7 +2210,7 @@
           </a:lstStyle>
           <a:p>
             <a:r>
-              <a:rPr lang="en-US" smtClean="0"/>
+              <a:rPr lang="en-US"/>
               <a:t>Click to edit Master title style</a:t>
             </a:r>
             <a:endParaRPr lang="en-US" dirty="0"/>
@@ -2259,7 +2275,7 @@
           </a:lstStyle>
           <a:p>
             <a:r>
-              <a:rPr lang="en-US" smtClean="0"/>
+              <a:rPr lang="en-US"/>
               <a:t>Click icon to add picture</a:t>
             </a:r>
             <a:endParaRPr lang="en-US" dirty="0"/>
@@ -2325,7 +2341,7 @@
           <a:p>
             <a:pPr lvl="0"/>
             <a:r>
-              <a:rPr lang="en-US" smtClean="0"/>
+              <a:rPr lang="en-US"/>
               <a:t>Edit Master text styles</a:t>
             </a:r>
           </a:p>
@@ -2348,7 +2364,7 @@
           <a:p>
             <a:fld id="{1096303F-26EC-4B2E-AB18-013C2CB4F05F}" type="datetimeFigureOut">
               <a:rPr lang="en-US" smtClean="0"/>
-              <a:t>3/1/2018</a:t>
+              <a:t>3/1/18</a:t>
             </a:fld>
             <a:endParaRPr lang="en-US"/>
           </a:p>
@@ -2457,7 +2473,7 @@
           <a:lstStyle/>
           <a:p>
             <a:r>
-              <a:rPr lang="en-US" smtClean="0"/>
+              <a:rPr lang="en-US"/>
               <a:t>Click to edit Master title style</a:t>
             </a:r>
             <a:endParaRPr lang="en-US" dirty="0"/>
@@ -2491,35 +2507,35 @@
           <a:p>
             <a:pPr lvl="0"/>
             <a:r>
-              <a:rPr lang="en-US" smtClean="0"/>
+              <a:rPr lang="en-US"/>
               <a:t>Edit Master text styles</a:t>
             </a:r>
           </a:p>
           <a:p>
             <a:pPr lvl="1"/>
             <a:r>
-              <a:rPr lang="en-US" smtClean="0"/>
+              <a:rPr lang="en-US"/>
               <a:t>Second level</a:t>
             </a:r>
           </a:p>
           <a:p>
             <a:pPr lvl="2"/>
             <a:r>
-              <a:rPr lang="en-US" smtClean="0"/>
+              <a:rPr lang="en-US"/>
               <a:t>Third level</a:t>
             </a:r>
           </a:p>
           <a:p>
             <a:pPr lvl="3"/>
             <a:r>
-              <a:rPr lang="en-US" smtClean="0"/>
+              <a:rPr lang="en-US"/>
               <a:t>Fourth level</a:t>
             </a:r>
           </a:p>
           <a:p>
             <a:pPr lvl="4"/>
             <a:r>
-              <a:rPr lang="en-US" smtClean="0"/>
+              <a:rPr lang="en-US"/>
               <a:t>Fifth level</a:t>
             </a:r>
             <a:endParaRPr lang="en-US" dirty="0"/>
@@ -2561,7 +2577,7 @@
           <a:p>
             <a:fld id="{1096303F-26EC-4B2E-AB18-013C2CB4F05F}" type="datetimeFigureOut">
               <a:rPr lang="en-US" smtClean="0"/>
-              <a:t>3/1/2018</a:t>
+              <a:t>3/1/18</a:t>
             </a:fld>
             <a:endParaRPr lang="en-US"/>
           </a:p>

</xml_diff>